<commit_message>
Explain causality, time, inside period, timeout conditions images
</commit_message>
<xml_diff>
--- a/demo/powerpoint/demo_maat_workflow.pptx
+++ b/demo/powerpoint/demo_maat_workflow.pptx
@@ -4742,7 +4742,7 @@
           </p:blipFill>
           <p:spPr>
             <a:xfrm>
-              <a:off x="2742518" y="327615"/>
+              <a:off x="4871722" y="691894"/>
               <a:ext cx="279880" cy="276425"/>
             </a:xfrm>
             <a:prstGeom prst="rect">
@@ -4831,11 +4831,7 @@
             <a:pPr algn="ctr"/>
             <a:r>
               <a:rPr lang="fr-FR" sz="1600" dirty="0" smtClean="0"/>
-              <a:t>and</a:t>
-            </a:r>
-            <a:r>
-              <a:rPr lang="fr-FR" sz="1600" dirty="0" smtClean="0"/>
-              <a:t> Time </a:t>
+              <a:t>and Time </a:t>
             </a:r>
             <a:r>
               <a:rPr lang="fr-FR" sz="1600" dirty="0" err="1" smtClean="0"/>

</xml_diff>